<commit_message>
Ajout - Doc serveur
MaJ - diagramme
</commit_message>
<xml_diff>
--- a/diagramme.pptx
+++ b/diagramme.pptx
@@ -105,6 +105,11 @@
       </a:defRPr>
     </a:lvl9pPr>
   </p:defaultTextStyle>
+  <p:extLst>
+    <p:ext uri="{EFAFB233-063F-42B5-8137-9DF3F51BA10A}">
+      <p15:sldGuideLst xmlns:p15="http://schemas.microsoft.com/office/powerpoint/2012/main"/>
+    </p:ext>
+  </p:extLst>
 </p:presentation>
 </file>
 
@@ -239,7 +244,7 @@
           <a:p>
             <a:fld id="{A5CE4BB5-0E3E-4D33-ACB2-CCF116211690}" type="datetimeFigureOut">
               <a:rPr lang="fr-FR" smtClean="0"/>
-              <a:t>19/03/2015</a:t>
+              <a:t>25/03/2015</a:t>
             </a:fld>
             <a:endParaRPr lang="fr-FR"/>
           </a:p>
@@ -409,7 +414,7 @@
           <a:p>
             <a:fld id="{A5CE4BB5-0E3E-4D33-ACB2-CCF116211690}" type="datetimeFigureOut">
               <a:rPr lang="fr-FR" smtClean="0"/>
-              <a:t>19/03/2015</a:t>
+              <a:t>25/03/2015</a:t>
             </a:fld>
             <a:endParaRPr lang="fr-FR"/>
           </a:p>
@@ -589,7 +594,7 @@
           <a:p>
             <a:fld id="{A5CE4BB5-0E3E-4D33-ACB2-CCF116211690}" type="datetimeFigureOut">
               <a:rPr lang="fr-FR" smtClean="0"/>
-              <a:t>19/03/2015</a:t>
+              <a:t>25/03/2015</a:t>
             </a:fld>
             <a:endParaRPr lang="fr-FR"/>
           </a:p>
@@ -759,7 +764,7 @@
           <a:p>
             <a:fld id="{A5CE4BB5-0E3E-4D33-ACB2-CCF116211690}" type="datetimeFigureOut">
               <a:rPr lang="fr-FR" smtClean="0"/>
-              <a:t>19/03/2015</a:t>
+              <a:t>25/03/2015</a:t>
             </a:fld>
             <a:endParaRPr lang="fr-FR"/>
           </a:p>
@@ -1005,7 +1010,7 @@
           <a:p>
             <a:fld id="{A5CE4BB5-0E3E-4D33-ACB2-CCF116211690}" type="datetimeFigureOut">
               <a:rPr lang="fr-FR" smtClean="0"/>
-              <a:t>19/03/2015</a:t>
+              <a:t>25/03/2015</a:t>
             </a:fld>
             <a:endParaRPr lang="fr-FR"/>
           </a:p>
@@ -1237,7 +1242,7 @@
           <a:p>
             <a:fld id="{A5CE4BB5-0E3E-4D33-ACB2-CCF116211690}" type="datetimeFigureOut">
               <a:rPr lang="fr-FR" smtClean="0"/>
-              <a:t>19/03/2015</a:t>
+              <a:t>25/03/2015</a:t>
             </a:fld>
             <a:endParaRPr lang="fr-FR"/>
           </a:p>
@@ -1604,7 +1609,7 @@
           <a:p>
             <a:fld id="{A5CE4BB5-0E3E-4D33-ACB2-CCF116211690}" type="datetimeFigureOut">
               <a:rPr lang="fr-FR" smtClean="0"/>
-              <a:t>19/03/2015</a:t>
+              <a:t>25/03/2015</a:t>
             </a:fld>
             <a:endParaRPr lang="fr-FR"/>
           </a:p>
@@ -1722,7 +1727,7 @@
           <a:p>
             <a:fld id="{A5CE4BB5-0E3E-4D33-ACB2-CCF116211690}" type="datetimeFigureOut">
               <a:rPr lang="fr-FR" smtClean="0"/>
-              <a:t>19/03/2015</a:t>
+              <a:t>25/03/2015</a:t>
             </a:fld>
             <a:endParaRPr lang="fr-FR"/>
           </a:p>
@@ -1817,7 +1822,7 @@
           <a:p>
             <a:fld id="{A5CE4BB5-0E3E-4D33-ACB2-CCF116211690}" type="datetimeFigureOut">
               <a:rPr lang="fr-FR" smtClean="0"/>
-              <a:t>19/03/2015</a:t>
+              <a:t>25/03/2015</a:t>
             </a:fld>
             <a:endParaRPr lang="fr-FR"/>
           </a:p>
@@ -2094,7 +2099,7 @@
           <a:p>
             <a:fld id="{A5CE4BB5-0E3E-4D33-ACB2-CCF116211690}" type="datetimeFigureOut">
               <a:rPr lang="fr-FR" smtClean="0"/>
-              <a:t>19/03/2015</a:t>
+              <a:t>25/03/2015</a:t>
             </a:fld>
             <a:endParaRPr lang="fr-FR"/>
           </a:p>
@@ -2347,7 +2352,7 @@
           <a:p>
             <a:fld id="{A5CE4BB5-0E3E-4D33-ACB2-CCF116211690}" type="datetimeFigureOut">
               <a:rPr lang="fr-FR" smtClean="0"/>
-              <a:t>19/03/2015</a:t>
+              <a:t>25/03/2015</a:t>
             </a:fld>
             <a:endParaRPr lang="fr-FR"/>
           </a:p>
@@ -2560,7 +2565,7 @@
           <a:p>
             <a:fld id="{A5CE4BB5-0E3E-4D33-ACB2-CCF116211690}" type="datetimeFigureOut">
               <a:rPr lang="fr-FR" smtClean="0"/>
-              <a:t>19/03/2015</a:t>
+              <a:t>25/03/2015</a:t>
             </a:fld>
             <a:endParaRPr lang="fr-FR"/>
           </a:p>
@@ -3155,7 +3160,19 @@
             <a:pPr algn="ctr"/>
             <a:r>
               <a:rPr lang="fr-FR" dirty="0" smtClean="0"/>
-              <a:t>Date - Heure - Valeur capteurs</a:t>
+              <a:t>Date - Heure </a:t>
+            </a:r>
+            <a:r>
+              <a:rPr lang="fr-FR" smtClean="0"/>
+              <a:t>- </a:t>
+            </a:r>
+            <a:r>
+              <a:rPr lang="fr-FR" smtClean="0"/>
+              <a:t>Valeurs </a:t>
+            </a:r>
+            <a:r>
+              <a:rPr lang="fr-FR" dirty="0" smtClean="0"/>
+              <a:t>capteurs</a:t>
             </a:r>
             <a:endParaRPr lang="fr-FR" dirty="0"/>
           </a:p>
@@ -3347,7 +3364,11 @@
             <a:pPr algn="ctr"/>
             <a:r>
               <a:rPr lang="fr-FR" dirty="0" smtClean="0"/>
-              <a:t>Dates – Capteur - Fréquence</a:t>
+              <a:t>Dates – </a:t>
+            </a:r>
+            <a:r>
+              <a:rPr lang="fr-FR" dirty="0" smtClean="0"/>
+              <a:t>Capteur</a:t>
             </a:r>
             <a:endParaRPr lang="fr-FR" dirty="0"/>
           </a:p>

</xml_diff>